<commit_message>
add scheduling.pptx paralleltime.pptx, edit sat-factors.pptx
</commit_message>
<xml_diff>
--- a/spring13/slides13/sat-factors.pptx
+++ b/spring13/slides13/sat-factors.pptx
@@ -923,7 +923,187 @@
 </p:notes>
 </file>
 
-<file path=ppt/notesSlides/notesSlide2.xml><?xml version="1.0" encoding="utf-8"?>
+<file path=ppt/notesSlides/notesSlide10.xml><?xml version="1.0" encoding="utf-8"?>
+<p:notes xmlns:a="http://schemas.openxmlformats.org/drawingml/2006/main" xmlns:r="http://schemas.openxmlformats.org/officeDocument/2006/relationships" xmlns:p="http://schemas.openxmlformats.org/presentationml/2006/main">
+  <p:cSld>
+    <p:spTree>
+      <p:nvGrpSpPr>
+        <p:cNvPr id="1" name=""/>
+        <p:cNvGrpSpPr/>
+        <p:nvPr/>
+      </p:nvGrpSpPr>
+      <p:grpSpPr>
+        <a:xfrm>
+          <a:off x="0" y="0"/>
+          <a:ext cx="0" cy="0"/>
+          <a:chOff x="0" y="0"/>
+          <a:chExt cx="0" cy="0"/>
+        </a:xfrm>
+      </p:grpSpPr>
+      <p:sp>
+        <p:nvSpPr>
+          <p:cNvPr id="2" name="Slide Image Placeholder 1"/>
+          <p:cNvSpPr>
+            <a:spLocks noGrp="1" noRot="1" noChangeAspect="1"/>
+          </p:cNvSpPr>
+          <p:nvPr>
+            <p:ph type="sldImg"/>
+          </p:nvPr>
+        </p:nvSpPr>
+        <p:spPr/>
+      </p:sp>
+      <p:sp>
+        <p:nvSpPr>
+          <p:cNvPr id="3" name="Notes Placeholder 2"/>
+          <p:cNvSpPr>
+            <a:spLocks noGrp="1"/>
+          </p:cNvSpPr>
+          <p:nvPr>
+            <p:ph type="body" idx="1"/>
+          </p:nvPr>
+        </p:nvSpPr>
+        <p:spPr/>
+        <p:txBody>
+          <a:bodyPr/>
+          <a:lstStyle/>
+          <a:p>
+            <a:endParaRPr lang="en-US"/>
+          </a:p>
+        </p:txBody>
+      </p:sp>
+      <p:sp>
+        <p:nvSpPr>
+          <p:cNvPr id="4" name="Slide Number Placeholder 3"/>
+          <p:cNvSpPr>
+            <a:spLocks noGrp="1"/>
+          </p:cNvSpPr>
+          <p:nvPr>
+            <p:ph type="sldNum" sz="quarter" idx="10"/>
+          </p:nvPr>
+        </p:nvSpPr>
+        <p:spPr/>
+        <p:txBody>
+          <a:bodyPr/>
+          <a:lstStyle/>
+          <a:p>
+            <a:pPr>
+              <a:defRPr/>
+            </a:pPr>
+            <a:fld id="{4B22597B-958D-4520-8A0D-91DE84F8B13A}" type="slidenum">
+              <a:rPr lang="en-US" smtClean="0"/>
+              <a:pPr>
+                <a:defRPr/>
+              </a:pPr>
+              <a:t>12</a:t>
+            </a:fld>
+            <a:endParaRPr lang="en-US"/>
+          </a:p>
+        </p:txBody>
+      </p:sp>
+    </p:spTree>
+    <p:extLst>
+      <p:ext uri="{BB962C8B-B14F-4D97-AF65-F5344CB8AC3E}">
+        <p14:creationId xmlns:p14="http://schemas.microsoft.com/office/powerpoint/2010/main" val="3390384337"/>
+      </p:ext>
+    </p:extLst>
+  </p:cSld>
+  <p:clrMapOvr>
+    <a:masterClrMapping/>
+  </p:clrMapOvr>
+</p:notes>
+</file>
+
+<file path=ppt/notesSlides/notesSlide11.xml><?xml version="1.0" encoding="utf-8"?>
+<p:notes xmlns:a="http://schemas.openxmlformats.org/drawingml/2006/main" xmlns:r="http://schemas.openxmlformats.org/officeDocument/2006/relationships" xmlns:p="http://schemas.openxmlformats.org/presentationml/2006/main">
+  <p:cSld>
+    <p:spTree>
+      <p:nvGrpSpPr>
+        <p:cNvPr id="1" name=""/>
+        <p:cNvGrpSpPr/>
+        <p:nvPr/>
+      </p:nvGrpSpPr>
+      <p:grpSpPr>
+        <a:xfrm>
+          <a:off x="0" y="0"/>
+          <a:ext cx="0" cy="0"/>
+          <a:chOff x="0" y="0"/>
+          <a:chExt cx="0" cy="0"/>
+        </a:xfrm>
+      </p:grpSpPr>
+      <p:sp>
+        <p:nvSpPr>
+          <p:cNvPr id="2" name="Slide Image Placeholder 1"/>
+          <p:cNvSpPr>
+            <a:spLocks noGrp="1" noRot="1" noChangeAspect="1"/>
+          </p:cNvSpPr>
+          <p:nvPr>
+            <p:ph type="sldImg"/>
+          </p:nvPr>
+        </p:nvSpPr>
+        <p:spPr/>
+      </p:sp>
+      <p:sp>
+        <p:nvSpPr>
+          <p:cNvPr id="3" name="Notes Placeholder 2"/>
+          <p:cNvSpPr>
+            <a:spLocks noGrp="1"/>
+          </p:cNvSpPr>
+          <p:nvPr>
+            <p:ph type="body" idx="1"/>
+          </p:nvPr>
+        </p:nvSpPr>
+        <p:spPr/>
+        <p:txBody>
+          <a:bodyPr/>
+          <a:lstStyle/>
+          <a:p>
+            <a:endParaRPr lang="en-US"/>
+          </a:p>
+        </p:txBody>
+      </p:sp>
+      <p:sp>
+        <p:nvSpPr>
+          <p:cNvPr id="4" name="Slide Number Placeholder 3"/>
+          <p:cNvSpPr>
+            <a:spLocks noGrp="1"/>
+          </p:cNvSpPr>
+          <p:nvPr>
+            <p:ph type="sldNum" sz="quarter" idx="10"/>
+          </p:nvPr>
+        </p:nvSpPr>
+        <p:spPr/>
+        <p:txBody>
+          <a:bodyPr/>
+          <a:lstStyle/>
+          <a:p>
+            <a:pPr>
+              <a:defRPr/>
+            </a:pPr>
+            <a:fld id="{4B22597B-958D-4520-8A0D-91DE84F8B13A}" type="slidenum">
+              <a:rPr lang="en-US" smtClean="0"/>
+              <a:pPr>
+                <a:defRPr/>
+              </a:pPr>
+              <a:t>13</a:t>
+            </a:fld>
+            <a:endParaRPr lang="en-US"/>
+          </a:p>
+        </p:txBody>
+      </p:sp>
+    </p:spTree>
+    <p:extLst>
+      <p:ext uri="{BB962C8B-B14F-4D97-AF65-F5344CB8AC3E}">
+        <p14:creationId xmlns:p14="http://schemas.microsoft.com/office/powerpoint/2010/main" val="692225079"/>
+      </p:ext>
+    </p:extLst>
+  </p:cSld>
+  <p:clrMapOvr>
+    <a:masterClrMapping/>
+  </p:clrMapOvr>
+</p:notes>
+</file>
+
+<file path=ppt/notesSlides/notesSlide12.xml><?xml version="1.0" encoding="utf-8"?>
 <p:notes xmlns:a="http://schemas.openxmlformats.org/drawingml/2006/main" xmlns:r="http://schemas.openxmlformats.org/officeDocument/2006/relationships" xmlns:p="http://schemas.openxmlformats.org/presentationml/2006/main">
   <p:cSld>
     <p:spTree>
@@ -1049,6 +1229,726 @@
         </p:txBody>
       </p:sp>
     </p:spTree>
+  </p:cSld>
+  <p:clrMapOvr>
+    <a:masterClrMapping/>
+  </p:clrMapOvr>
+</p:notes>
+</file>
+
+<file path=ppt/notesSlides/notesSlide2.xml><?xml version="1.0" encoding="utf-8"?>
+<p:notes xmlns:a="http://schemas.openxmlformats.org/drawingml/2006/main" xmlns:r="http://schemas.openxmlformats.org/officeDocument/2006/relationships" xmlns:p="http://schemas.openxmlformats.org/presentationml/2006/main">
+  <p:cSld>
+    <p:spTree>
+      <p:nvGrpSpPr>
+        <p:cNvPr id="1" name=""/>
+        <p:cNvGrpSpPr/>
+        <p:nvPr/>
+      </p:nvGrpSpPr>
+      <p:grpSpPr>
+        <a:xfrm>
+          <a:off x="0" y="0"/>
+          <a:ext cx="0" cy="0"/>
+          <a:chOff x="0" y="0"/>
+          <a:chExt cx="0" cy="0"/>
+        </a:xfrm>
+      </p:grpSpPr>
+      <p:sp>
+        <p:nvSpPr>
+          <p:cNvPr id="2" name="Slide Image Placeholder 1"/>
+          <p:cNvSpPr>
+            <a:spLocks noGrp="1" noRot="1" noChangeAspect="1"/>
+          </p:cNvSpPr>
+          <p:nvPr>
+            <p:ph type="sldImg"/>
+          </p:nvPr>
+        </p:nvSpPr>
+        <p:spPr/>
+      </p:sp>
+      <p:sp>
+        <p:nvSpPr>
+          <p:cNvPr id="3" name="Notes Placeholder 2"/>
+          <p:cNvSpPr>
+            <a:spLocks noGrp="1"/>
+          </p:cNvSpPr>
+          <p:nvPr>
+            <p:ph type="body" idx="1"/>
+          </p:nvPr>
+        </p:nvSpPr>
+        <p:spPr/>
+        <p:txBody>
+          <a:bodyPr/>
+          <a:lstStyle/>
+          <a:p>
+            <a:endParaRPr lang="en-US"/>
+          </a:p>
+        </p:txBody>
+      </p:sp>
+      <p:sp>
+        <p:nvSpPr>
+          <p:cNvPr id="4" name="Slide Number Placeholder 3"/>
+          <p:cNvSpPr>
+            <a:spLocks noGrp="1"/>
+          </p:cNvSpPr>
+          <p:nvPr>
+            <p:ph type="sldNum" sz="quarter" idx="10"/>
+          </p:nvPr>
+        </p:nvSpPr>
+        <p:spPr/>
+        <p:txBody>
+          <a:bodyPr/>
+          <a:lstStyle/>
+          <a:p>
+            <a:pPr>
+              <a:defRPr/>
+            </a:pPr>
+            <a:fld id="{4B22597B-958D-4520-8A0D-91DE84F8B13A}" type="slidenum">
+              <a:rPr lang="en-US" smtClean="0"/>
+              <a:pPr>
+                <a:defRPr/>
+              </a:pPr>
+              <a:t>2</a:t>
+            </a:fld>
+            <a:endParaRPr lang="en-US"/>
+          </a:p>
+        </p:txBody>
+      </p:sp>
+    </p:spTree>
+    <p:extLst>
+      <p:ext uri="{BB962C8B-B14F-4D97-AF65-F5344CB8AC3E}">
+        <p14:creationId xmlns:p14="http://schemas.microsoft.com/office/powerpoint/2010/main" val="560099769"/>
+      </p:ext>
+    </p:extLst>
+  </p:cSld>
+  <p:clrMapOvr>
+    <a:masterClrMapping/>
+  </p:clrMapOvr>
+</p:notes>
+</file>
+
+<file path=ppt/notesSlides/notesSlide3.xml><?xml version="1.0" encoding="utf-8"?>
+<p:notes xmlns:a="http://schemas.openxmlformats.org/drawingml/2006/main" xmlns:r="http://schemas.openxmlformats.org/officeDocument/2006/relationships" xmlns:p="http://schemas.openxmlformats.org/presentationml/2006/main">
+  <p:cSld>
+    <p:spTree>
+      <p:nvGrpSpPr>
+        <p:cNvPr id="1" name=""/>
+        <p:cNvGrpSpPr/>
+        <p:nvPr/>
+      </p:nvGrpSpPr>
+      <p:grpSpPr>
+        <a:xfrm>
+          <a:off x="0" y="0"/>
+          <a:ext cx="0" cy="0"/>
+          <a:chOff x="0" y="0"/>
+          <a:chExt cx="0" cy="0"/>
+        </a:xfrm>
+      </p:grpSpPr>
+      <p:sp>
+        <p:nvSpPr>
+          <p:cNvPr id="2" name="Slide Image Placeholder 1"/>
+          <p:cNvSpPr>
+            <a:spLocks noGrp="1" noRot="1" noChangeAspect="1"/>
+          </p:cNvSpPr>
+          <p:nvPr>
+            <p:ph type="sldImg"/>
+          </p:nvPr>
+        </p:nvSpPr>
+        <p:spPr/>
+      </p:sp>
+      <p:sp>
+        <p:nvSpPr>
+          <p:cNvPr id="3" name="Notes Placeholder 2"/>
+          <p:cNvSpPr>
+            <a:spLocks noGrp="1"/>
+          </p:cNvSpPr>
+          <p:nvPr>
+            <p:ph type="body" idx="1"/>
+          </p:nvPr>
+        </p:nvSpPr>
+        <p:spPr/>
+        <p:txBody>
+          <a:bodyPr/>
+          <a:lstStyle/>
+          <a:p>
+            <a:endParaRPr lang="en-US"/>
+          </a:p>
+        </p:txBody>
+      </p:sp>
+      <p:sp>
+        <p:nvSpPr>
+          <p:cNvPr id="4" name="Slide Number Placeholder 3"/>
+          <p:cNvSpPr>
+            <a:spLocks noGrp="1"/>
+          </p:cNvSpPr>
+          <p:nvPr>
+            <p:ph type="sldNum" sz="quarter" idx="10"/>
+          </p:nvPr>
+        </p:nvSpPr>
+        <p:spPr/>
+        <p:txBody>
+          <a:bodyPr/>
+          <a:lstStyle/>
+          <a:p>
+            <a:pPr>
+              <a:defRPr/>
+            </a:pPr>
+            <a:fld id="{4B22597B-958D-4520-8A0D-91DE84F8B13A}" type="slidenum">
+              <a:rPr lang="en-US" smtClean="0"/>
+              <a:pPr>
+                <a:defRPr/>
+              </a:pPr>
+              <a:t>4</a:t>
+            </a:fld>
+            <a:endParaRPr lang="en-US"/>
+          </a:p>
+        </p:txBody>
+      </p:sp>
+    </p:spTree>
+    <p:extLst>
+      <p:ext uri="{BB962C8B-B14F-4D97-AF65-F5344CB8AC3E}">
+        <p14:creationId xmlns:p14="http://schemas.microsoft.com/office/powerpoint/2010/main" val="1460030444"/>
+      </p:ext>
+    </p:extLst>
+  </p:cSld>
+  <p:clrMapOvr>
+    <a:masterClrMapping/>
+  </p:clrMapOvr>
+</p:notes>
+</file>
+
+<file path=ppt/notesSlides/notesSlide4.xml><?xml version="1.0" encoding="utf-8"?>
+<p:notes xmlns:a="http://schemas.openxmlformats.org/drawingml/2006/main" xmlns:r="http://schemas.openxmlformats.org/officeDocument/2006/relationships" xmlns:p="http://schemas.openxmlformats.org/presentationml/2006/main">
+  <p:cSld>
+    <p:spTree>
+      <p:nvGrpSpPr>
+        <p:cNvPr id="1" name=""/>
+        <p:cNvGrpSpPr/>
+        <p:nvPr/>
+      </p:nvGrpSpPr>
+      <p:grpSpPr>
+        <a:xfrm>
+          <a:off x="0" y="0"/>
+          <a:ext cx="0" cy="0"/>
+          <a:chOff x="0" y="0"/>
+          <a:chExt cx="0" cy="0"/>
+        </a:xfrm>
+      </p:grpSpPr>
+      <p:sp>
+        <p:nvSpPr>
+          <p:cNvPr id="2" name="Slide Image Placeholder 1"/>
+          <p:cNvSpPr>
+            <a:spLocks noGrp="1" noRot="1" noChangeAspect="1"/>
+          </p:cNvSpPr>
+          <p:nvPr>
+            <p:ph type="sldImg"/>
+          </p:nvPr>
+        </p:nvSpPr>
+        <p:spPr/>
+      </p:sp>
+      <p:sp>
+        <p:nvSpPr>
+          <p:cNvPr id="3" name="Notes Placeholder 2"/>
+          <p:cNvSpPr>
+            <a:spLocks noGrp="1"/>
+          </p:cNvSpPr>
+          <p:nvPr>
+            <p:ph type="body" idx="1"/>
+          </p:nvPr>
+        </p:nvSpPr>
+        <p:spPr/>
+        <p:txBody>
+          <a:bodyPr/>
+          <a:lstStyle/>
+          <a:p>
+            <a:endParaRPr lang="en-US"/>
+          </a:p>
+        </p:txBody>
+      </p:sp>
+      <p:sp>
+        <p:nvSpPr>
+          <p:cNvPr id="4" name="Slide Number Placeholder 3"/>
+          <p:cNvSpPr>
+            <a:spLocks noGrp="1"/>
+          </p:cNvSpPr>
+          <p:nvPr>
+            <p:ph type="sldNum" sz="quarter" idx="10"/>
+          </p:nvPr>
+        </p:nvSpPr>
+        <p:spPr/>
+        <p:txBody>
+          <a:bodyPr/>
+          <a:lstStyle/>
+          <a:p>
+            <a:pPr>
+              <a:defRPr/>
+            </a:pPr>
+            <a:fld id="{4B22597B-958D-4520-8A0D-91DE84F8B13A}" type="slidenum">
+              <a:rPr lang="en-US" smtClean="0"/>
+              <a:pPr>
+                <a:defRPr/>
+              </a:pPr>
+              <a:t>5</a:t>
+            </a:fld>
+            <a:endParaRPr lang="en-US"/>
+          </a:p>
+        </p:txBody>
+      </p:sp>
+    </p:spTree>
+    <p:extLst>
+      <p:ext uri="{BB962C8B-B14F-4D97-AF65-F5344CB8AC3E}">
+        <p14:creationId xmlns:p14="http://schemas.microsoft.com/office/powerpoint/2010/main" val="3822073855"/>
+      </p:ext>
+    </p:extLst>
+  </p:cSld>
+  <p:clrMapOvr>
+    <a:masterClrMapping/>
+  </p:clrMapOvr>
+</p:notes>
+</file>
+
+<file path=ppt/notesSlides/notesSlide5.xml><?xml version="1.0" encoding="utf-8"?>
+<p:notes xmlns:a="http://schemas.openxmlformats.org/drawingml/2006/main" xmlns:r="http://schemas.openxmlformats.org/officeDocument/2006/relationships" xmlns:p="http://schemas.openxmlformats.org/presentationml/2006/main">
+  <p:cSld>
+    <p:spTree>
+      <p:nvGrpSpPr>
+        <p:cNvPr id="1" name=""/>
+        <p:cNvGrpSpPr/>
+        <p:nvPr/>
+      </p:nvGrpSpPr>
+      <p:grpSpPr>
+        <a:xfrm>
+          <a:off x="0" y="0"/>
+          <a:ext cx="0" cy="0"/>
+          <a:chOff x="0" y="0"/>
+          <a:chExt cx="0" cy="0"/>
+        </a:xfrm>
+      </p:grpSpPr>
+      <p:sp>
+        <p:nvSpPr>
+          <p:cNvPr id="2" name="Slide Image Placeholder 1"/>
+          <p:cNvSpPr>
+            <a:spLocks noGrp="1" noRot="1" noChangeAspect="1"/>
+          </p:cNvSpPr>
+          <p:nvPr>
+            <p:ph type="sldImg"/>
+          </p:nvPr>
+        </p:nvSpPr>
+        <p:spPr/>
+      </p:sp>
+      <p:sp>
+        <p:nvSpPr>
+          <p:cNvPr id="3" name="Notes Placeholder 2"/>
+          <p:cNvSpPr>
+            <a:spLocks noGrp="1"/>
+          </p:cNvSpPr>
+          <p:nvPr>
+            <p:ph type="body" idx="1"/>
+          </p:nvPr>
+        </p:nvSpPr>
+        <p:spPr/>
+        <p:txBody>
+          <a:bodyPr/>
+          <a:lstStyle/>
+          <a:p>
+            <a:endParaRPr lang="en-US"/>
+          </a:p>
+        </p:txBody>
+      </p:sp>
+      <p:sp>
+        <p:nvSpPr>
+          <p:cNvPr id="4" name="Slide Number Placeholder 3"/>
+          <p:cNvSpPr>
+            <a:spLocks noGrp="1"/>
+          </p:cNvSpPr>
+          <p:nvPr>
+            <p:ph type="sldNum" sz="quarter" idx="10"/>
+          </p:nvPr>
+        </p:nvSpPr>
+        <p:spPr/>
+        <p:txBody>
+          <a:bodyPr/>
+          <a:lstStyle/>
+          <a:p>
+            <a:pPr>
+              <a:defRPr/>
+            </a:pPr>
+            <a:fld id="{4B22597B-958D-4520-8A0D-91DE84F8B13A}" type="slidenum">
+              <a:rPr lang="en-US" smtClean="0"/>
+              <a:pPr>
+                <a:defRPr/>
+              </a:pPr>
+              <a:t>6</a:t>
+            </a:fld>
+            <a:endParaRPr lang="en-US"/>
+          </a:p>
+        </p:txBody>
+      </p:sp>
+    </p:spTree>
+    <p:extLst>
+      <p:ext uri="{BB962C8B-B14F-4D97-AF65-F5344CB8AC3E}">
+        <p14:creationId xmlns:p14="http://schemas.microsoft.com/office/powerpoint/2010/main" val="6319460"/>
+      </p:ext>
+    </p:extLst>
+  </p:cSld>
+  <p:clrMapOvr>
+    <a:masterClrMapping/>
+  </p:clrMapOvr>
+</p:notes>
+</file>
+
+<file path=ppt/notesSlides/notesSlide6.xml><?xml version="1.0" encoding="utf-8"?>
+<p:notes xmlns:a="http://schemas.openxmlformats.org/drawingml/2006/main" xmlns:r="http://schemas.openxmlformats.org/officeDocument/2006/relationships" xmlns:p="http://schemas.openxmlformats.org/presentationml/2006/main">
+  <p:cSld>
+    <p:spTree>
+      <p:nvGrpSpPr>
+        <p:cNvPr id="1" name=""/>
+        <p:cNvGrpSpPr/>
+        <p:nvPr/>
+      </p:nvGrpSpPr>
+      <p:grpSpPr>
+        <a:xfrm>
+          <a:off x="0" y="0"/>
+          <a:ext cx="0" cy="0"/>
+          <a:chOff x="0" y="0"/>
+          <a:chExt cx="0" cy="0"/>
+        </a:xfrm>
+      </p:grpSpPr>
+      <p:sp>
+        <p:nvSpPr>
+          <p:cNvPr id="2" name="Slide Image Placeholder 1"/>
+          <p:cNvSpPr>
+            <a:spLocks noGrp="1" noRot="1" noChangeAspect="1"/>
+          </p:cNvSpPr>
+          <p:nvPr>
+            <p:ph type="sldImg"/>
+          </p:nvPr>
+        </p:nvSpPr>
+        <p:spPr/>
+      </p:sp>
+      <p:sp>
+        <p:nvSpPr>
+          <p:cNvPr id="3" name="Notes Placeholder 2"/>
+          <p:cNvSpPr>
+            <a:spLocks noGrp="1"/>
+          </p:cNvSpPr>
+          <p:nvPr>
+            <p:ph type="body" idx="1"/>
+          </p:nvPr>
+        </p:nvSpPr>
+        <p:spPr/>
+        <p:txBody>
+          <a:bodyPr/>
+          <a:lstStyle/>
+          <a:p>
+            <a:endParaRPr lang="en-US"/>
+          </a:p>
+        </p:txBody>
+      </p:sp>
+      <p:sp>
+        <p:nvSpPr>
+          <p:cNvPr id="4" name="Slide Number Placeholder 3"/>
+          <p:cNvSpPr>
+            <a:spLocks noGrp="1"/>
+          </p:cNvSpPr>
+          <p:nvPr>
+            <p:ph type="sldNum" sz="quarter" idx="10"/>
+          </p:nvPr>
+        </p:nvSpPr>
+        <p:spPr/>
+        <p:txBody>
+          <a:bodyPr/>
+          <a:lstStyle/>
+          <a:p>
+            <a:pPr>
+              <a:defRPr/>
+            </a:pPr>
+            <a:fld id="{4B22597B-958D-4520-8A0D-91DE84F8B13A}" type="slidenum">
+              <a:rPr lang="en-US" smtClean="0"/>
+              <a:pPr>
+                <a:defRPr/>
+              </a:pPr>
+              <a:t>7</a:t>
+            </a:fld>
+            <a:endParaRPr lang="en-US"/>
+          </a:p>
+        </p:txBody>
+      </p:sp>
+    </p:spTree>
+    <p:extLst>
+      <p:ext uri="{BB962C8B-B14F-4D97-AF65-F5344CB8AC3E}">
+        <p14:creationId xmlns:p14="http://schemas.microsoft.com/office/powerpoint/2010/main" val="3528276371"/>
+      </p:ext>
+    </p:extLst>
+  </p:cSld>
+  <p:clrMapOvr>
+    <a:masterClrMapping/>
+  </p:clrMapOvr>
+</p:notes>
+</file>
+
+<file path=ppt/notesSlides/notesSlide7.xml><?xml version="1.0" encoding="utf-8"?>
+<p:notes xmlns:a="http://schemas.openxmlformats.org/drawingml/2006/main" xmlns:r="http://schemas.openxmlformats.org/officeDocument/2006/relationships" xmlns:p="http://schemas.openxmlformats.org/presentationml/2006/main">
+  <p:cSld>
+    <p:spTree>
+      <p:nvGrpSpPr>
+        <p:cNvPr id="1" name=""/>
+        <p:cNvGrpSpPr/>
+        <p:nvPr/>
+      </p:nvGrpSpPr>
+      <p:grpSpPr>
+        <a:xfrm>
+          <a:off x="0" y="0"/>
+          <a:ext cx="0" cy="0"/>
+          <a:chOff x="0" y="0"/>
+          <a:chExt cx="0" cy="0"/>
+        </a:xfrm>
+      </p:grpSpPr>
+      <p:sp>
+        <p:nvSpPr>
+          <p:cNvPr id="2" name="Slide Image Placeholder 1"/>
+          <p:cNvSpPr>
+            <a:spLocks noGrp="1" noRot="1" noChangeAspect="1"/>
+          </p:cNvSpPr>
+          <p:nvPr>
+            <p:ph type="sldImg"/>
+          </p:nvPr>
+        </p:nvSpPr>
+        <p:spPr/>
+      </p:sp>
+      <p:sp>
+        <p:nvSpPr>
+          <p:cNvPr id="3" name="Notes Placeholder 2"/>
+          <p:cNvSpPr>
+            <a:spLocks noGrp="1"/>
+          </p:cNvSpPr>
+          <p:nvPr>
+            <p:ph type="body" idx="1"/>
+          </p:nvPr>
+        </p:nvSpPr>
+        <p:spPr/>
+        <p:txBody>
+          <a:bodyPr/>
+          <a:lstStyle/>
+          <a:p>
+            <a:endParaRPr lang="en-US"/>
+          </a:p>
+        </p:txBody>
+      </p:sp>
+      <p:sp>
+        <p:nvSpPr>
+          <p:cNvPr id="4" name="Slide Number Placeholder 3"/>
+          <p:cNvSpPr>
+            <a:spLocks noGrp="1"/>
+          </p:cNvSpPr>
+          <p:nvPr>
+            <p:ph type="sldNum" sz="quarter" idx="10"/>
+          </p:nvPr>
+        </p:nvSpPr>
+        <p:spPr/>
+        <p:txBody>
+          <a:bodyPr/>
+          <a:lstStyle/>
+          <a:p>
+            <a:pPr>
+              <a:defRPr/>
+            </a:pPr>
+            <a:fld id="{4B22597B-958D-4520-8A0D-91DE84F8B13A}" type="slidenum">
+              <a:rPr lang="en-US" smtClean="0"/>
+              <a:pPr>
+                <a:defRPr/>
+              </a:pPr>
+              <a:t>8</a:t>
+            </a:fld>
+            <a:endParaRPr lang="en-US"/>
+          </a:p>
+        </p:txBody>
+      </p:sp>
+    </p:spTree>
+    <p:extLst>
+      <p:ext uri="{BB962C8B-B14F-4D97-AF65-F5344CB8AC3E}">
+        <p14:creationId xmlns:p14="http://schemas.microsoft.com/office/powerpoint/2010/main" val="1219191106"/>
+      </p:ext>
+    </p:extLst>
+  </p:cSld>
+  <p:clrMapOvr>
+    <a:masterClrMapping/>
+  </p:clrMapOvr>
+</p:notes>
+</file>
+
+<file path=ppt/notesSlides/notesSlide8.xml><?xml version="1.0" encoding="utf-8"?>
+<p:notes xmlns:a="http://schemas.openxmlformats.org/drawingml/2006/main" xmlns:r="http://schemas.openxmlformats.org/officeDocument/2006/relationships" xmlns:p="http://schemas.openxmlformats.org/presentationml/2006/main">
+  <p:cSld>
+    <p:spTree>
+      <p:nvGrpSpPr>
+        <p:cNvPr id="1" name=""/>
+        <p:cNvGrpSpPr/>
+        <p:nvPr/>
+      </p:nvGrpSpPr>
+      <p:grpSpPr>
+        <a:xfrm>
+          <a:off x="0" y="0"/>
+          <a:ext cx="0" cy="0"/>
+          <a:chOff x="0" y="0"/>
+          <a:chExt cx="0" cy="0"/>
+        </a:xfrm>
+      </p:grpSpPr>
+      <p:sp>
+        <p:nvSpPr>
+          <p:cNvPr id="2" name="Slide Image Placeholder 1"/>
+          <p:cNvSpPr>
+            <a:spLocks noGrp="1" noRot="1" noChangeAspect="1"/>
+          </p:cNvSpPr>
+          <p:nvPr>
+            <p:ph type="sldImg"/>
+          </p:nvPr>
+        </p:nvSpPr>
+        <p:spPr/>
+      </p:sp>
+      <p:sp>
+        <p:nvSpPr>
+          <p:cNvPr id="3" name="Notes Placeholder 2"/>
+          <p:cNvSpPr>
+            <a:spLocks noGrp="1"/>
+          </p:cNvSpPr>
+          <p:nvPr>
+            <p:ph type="body" idx="1"/>
+          </p:nvPr>
+        </p:nvSpPr>
+        <p:spPr/>
+        <p:txBody>
+          <a:bodyPr/>
+          <a:lstStyle/>
+          <a:p>
+            <a:endParaRPr lang="en-US"/>
+          </a:p>
+        </p:txBody>
+      </p:sp>
+      <p:sp>
+        <p:nvSpPr>
+          <p:cNvPr id="4" name="Slide Number Placeholder 3"/>
+          <p:cNvSpPr>
+            <a:spLocks noGrp="1"/>
+          </p:cNvSpPr>
+          <p:nvPr>
+            <p:ph type="sldNum" sz="quarter" idx="10"/>
+          </p:nvPr>
+        </p:nvSpPr>
+        <p:spPr/>
+        <p:txBody>
+          <a:bodyPr/>
+          <a:lstStyle/>
+          <a:p>
+            <a:pPr>
+              <a:defRPr/>
+            </a:pPr>
+            <a:fld id="{4B22597B-958D-4520-8A0D-91DE84F8B13A}" type="slidenum">
+              <a:rPr lang="en-US" smtClean="0"/>
+              <a:pPr>
+                <a:defRPr/>
+              </a:pPr>
+              <a:t>9</a:t>
+            </a:fld>
+            <a:endParaRPr lang="en-US"/>
+          </a:p>
+        </p:txBody>
+      </p:sp>
+    </p:spTree>
+    <p:extLst>
+      <p:ext uri="{BB962C8B-B14F-4D97-AF65-F5344CB8AC3E}">
+        <p14:creationId xmlns:p14="http://schemas.microsoft.com/office/powerpoint/2010/main" val="1254551265"/>
+      </p:ext>
+    </p:extLst>
+  </p:cSld>
+  <p:clrMapOvr>
+    <a:masterClrMapping/>
+  </p:clrMapOvr>
+</p:notes>
+</file>
+
+<file path=ppt/notesSlides/notesSlide9.xml><?xml version="1.0" encoding="utf-8"?>
+<p:notes xmlns:a="http://schemas.openxmlformats.org/drawingml/2006/main" xmlns:r="http://schemas.openxmlformats.org/officeDocument/2006/relationships" xmlns:p="http://schemas.openxmlformats.org/presentationml/2006/main">
+  <p:cSld>
+    <p:spTree>
+      <p:nvGrpSpPr>
+        <p:cNvPr id="1" name=""/>
+        <p:cNvGrpSpPr/>
+        <p:nvPr/>
+      </p:nvGrpSpPr>
+      <p:grpSpPr>
+        <a:xfrm>
+          <a:off x="0" y="0"/>
+          <a:ext cx="0" cy="0"/>
+          <a:chOff x="0" y="0"/>
+          <a:chExt cx="0" cy="0"/>
+        </a:xfrm>
+      </p:grpSpPr>
+      <p:sp>
+        <p:nvSpPr>
+          <p:cNvPr id="2" name="Slide Image Placeholder 1"/>
+          <p:cNvSpPr>
+            <a:spLocks noGrp="1" noRot="1" noChangeAspect="1"/>
+          </p:cNvSpPr>
+          <p:nvPr>
+            <p:ph type="sldImg"/>
+          </p:nvPr>
+        </p:nvSpPr>
+        <p:spPr/>
+      </p:sp>
+      <p:sp>
+        <p:nvSpPr>
+          <p:cNvPr id="3" name="Notes Placeholder 2"/>
+          <p:cNvSpPr>
+            <a:spLocks noGrp="1"/>
+          </p:cNvSpPr>
+          <p:nvPr>
+            <p:ph type="body" idx="1"/>
+          </p:nvPr>
+        </p:nvSpPr>
+        <p:spPr/>
+        <p:txBody>
+          <a:bodyPr/>
+          <a:lstStyle/>
+          <a:p>
+            <a:endParaRPr lang="en-US"/>
+          </a:p>
+        </p:txBody>
+      </p:sp>
+      <p:sp>
+        <p:nvSpPr>
+          <p:cNvPr id="4" name="Slide Number Placeholder 3"/>
+          <p:cNvSpPr>
+            <a:spLocks noGrp="1"/>
+          </p:cNvSpPr>
+          <p:nvPr>
+            <p:ph type="sldNum" sz="quarter" idx="10"/>
+          </p:nvPr>
+        </p:nvSpPr>
+        <p:spPr/>
+        <p:txBody>
+          <a:bodyPr/>
+          <a:lstStyle/>
+          <a:p>
+            <a:pPr>
+              <a:defRPr/>
+            </a:pPr>
+            <a:fld id="{4B22597B-958D-4520-8A0D-91DE84F8B13A}" type="slidenum">
+              <a:rPr lang="en-US" smtClean="0"/>
+              <a:pPr>
+                <a:defRPr/>
+              </a:pPr>
+              <a:t>11</a:t>
+            </a:fld>
+            <a:endParaRPr lang="en-US"/>
+          </a:p>
+        </p:txBody>
+      </p:sp>
+    </p:spTree>
+    <p:extLst>
+      <p:ext uri="{BB962C8B-B14F-4D97-AF65-F5344CB8AC3E}">
+        <p14:creationId xmlns:p14="http://schemas.microsoft.com/office/powerpoint/2010/main" val="154663298"/>
+      </p:ext>
+    </p:extLst>
   </p:cSld>
   <p:clrMapOvr>
     <a:masterClrMapping/>
@@ -1223,11 +2123,7 @@
             </a:r>
             <a:r>
               <a:rPr lang="en-US" sz="1200" dirty="0" smtClean="0"/>
-              <a:t>.</a:t>
-            </a:r>
-            <a:r>
-              <a:rPr lang="en-US" sz="1200" dirty="0" smtClean="0"/>
-              <a:t>‹#›</a:t>
+              <a:t>.‹#›</a:t>
             </a:r>
             <a:endParaRPr lang="en-US" sz="1200" dirty="0"/>
           </a:p>
@@ -1238,13 +2134,13 @@
   <p:clrMapOvr>
     <a:masterClrMapping/>
   </p:clrMapOvr>
-  <mc:AlternateContent xmlns:mc="http://schemas.openxmlformats.org/markup-compatibility/2006">
-    <mc:Choice xmlns:p14="http://schemas.microsoft.com/office/powerpoint/2010/main" Requires="p14">
+  <mc:AlternateContent xmlns:mc="http://schemas.openxmlformats.org/markup-compatibility/2006" xmlns:p14="http://schemas.microsoft.com/office/powerpoint/2010/main">
+    <mc:Choice Requires="p14">
       <p:transition spd="slow" p14:dur="900" advClick="0">
         <p:fade/>
       </p:transition>
     </mc:Choice>
-    <mc:Fallback>
+    <mc:Fallback xmlns="">
       <p:transition xmlns:p14="http://schemas.microsoft.com/office/powerpoint/2010/main" spd="slow" advClick="0">
         <p:fade/>
       </p:transition>
@@ -1406,11 +2302,7 @@
             </a:r>
             <a:r>
               <a:rPr lang="en-US" sz="1200" dirty="0" smtClean="0"/>
-              <a:t>.</a:t>
-            </a:r>
-            <a:r>
-              <a:rPr lang="en-US" sz="1200" dirty="0" smtClean="0"/>
-              <a:t>‹#›</a:t>
+              <a:t>.‹#›</a:t>
             </a:r>
             <a:endParaRPr lang="en-US" sz="1200" dirty="0"/>
           </a:p>
@@ -1421,13 +2313,13 @@
   <p:clrMapOvr>
     <a:masterClrMapping/>
   </p:clrMapOvr>
-  <mc:AlternateContent xmlns:mc="http://schemas.openxmlformats.org/markup-compatibility/2006">
-    <mc:Choice xmlns:p14="http://schemas.microsoft.com/office/powerpoint/2010/main" Requires="p14">
+  <mc:AlternateContent xmlns:mc="http://schemas.openxmlformats.org/markup-compatibility/2006" xmlns:p14="http://schemas.microsoft.com/office/powerpoint/2010/main">
+    <mc:Choice Requires="p14">
       <p:transition spd="slow" p14:dur="900" advClick="0">
         <p:fade/>
       </p:transition>
     </mc:Choice>
-    <mc:Fallback>
+    <mc:Fallback xmlns="">
       <p:transition xmlns:p14="http://schemas.microsoft.com/office/powerpoint/2010/main" spd="slow" advClick="0">
         <p:fade/>
       </p:transition>
@@ -1607,11 +2499,7 @@
             </a:r>
             <a:r>
               <a:rPr lang="en-US" sz="1200" dirty="0" smtClean="0"/>
-              <a:t>.</a:t>
-            </a:r>
-            <a:r>
-              <a:rPr lang="en-US" sz="1200" dirty="0" smtClean="0"/>
-              <a:t>‹#›</a:t>
+              <a:t>.‹#›</a:t>
             </a:r>
             <a:endParaRPr lang="en-US" sz="1200" dirty="0"/>
           </a:p>
@@ -1622,13 +2510,13 @@
   <p:clrMapOvr>
     <a:masterClrMapping/>
   </p:clrMapOvr>
-  <mc:AlternateContent xmlns:mc="http://schemas.openxmlformats.org/markup-compatibility/2006">
-    <mc:Choice xmlns:p14="http://schemas.microsoft.com/office/powerpoint/2010/main" Requires="p14">
+  <mc:AlternateContent xmlns:mc="http://schemas.openxmlformats.org/markup-compatibility/2006" xmlns:p14="http://schemas.microsoft.com/office/powerpoint/2010/main">
+    <mc:Choice Requires="p14">
       <p:transition spd="slow" p14:dur="900" advClick="0">
         <p:fade/>
       </p:transition>
     </mc:Choice>
-    <mc:Fallback>
+    <mc:Fallback xmlns="">
       <p:transition xmlns:p14="http://schemas.microsoft.com/office/powerpoint/2010/main" spd="slow" advClick="0">
         <p:fade/>
       </p:transition>
@@ -1736,13 +2624,13 @@
   <p:clrMapOvr>
     <a:masterClrMapping/>
   </p:clrMapOvr>
-  <mc:AlternateContent xmlns:mc="http://schemas.openxmlformats.org/markup-compatibility/2006">
-    <mc:Choice xmlns:p14="http://schemas.microsoft.com/office/powerpoint/2010/main" Requires="p14">
+  <mc:AlternateContent xmlns:mc="http://schemas.openxmlformats.org/markup-compatibility/2006" xmlns:p14="http://schemas.microsoft.com/office/powerpoint/2010/main">
+    <mc:Choice Requires="p14">
       <p:transition spd="slow" p14:dur="900" advClick="0">
         <p:fade/>
       </p:transition>
     </mc:Choice>
-    <mc:Fallback>
+    <mc:Fallback xmlns="">
       <p:transition xmlns:p14="http://schemas.microsoft.com/office/powerpoint/2010/main" spd="slow" advClick="0">
         <p:fade/>
       </p:transition>
@@ -1969,13 +2857,13 @@
   <p:clrMapOvr>
     <a:masterClrMapping/>
   </p:clrMapOvr>
-  <mc:AlternateContent xmlns:mc="http://schemas.openxmlformats.org/markup-compatibility/2006">
-    <mc:Choice xmlns:p14="http://schemas.microsoft.com/office/powerpoint/2010/main" Requires="p14">
+  <mc:AlternateContent xmlns:mc="http://schemas.openxmlformats.org/markup-compatibility/2006" xmlns:p14="http://schemas.microsoft.com/office/powerpoint/2010/main">
+    <mc:Choice Requires="p14">
       <p:transition spd="slow" p14:dur="900" advClick="0">
         <p:fade/>
       </p:transition>
     </mc:Choice>
-    <mc:Fallback>
+    <mc:Fallback xmlns="">
       <p:transition xmlns:p14="http://schemas.microsoft.com/office/powerpoint/2010/main" spd="slow" advClick="0">
         <p:fade/>
       </p:transition>
@@ -2056,13 +2944,13 @@
   <p:clrMapOvr>
     <a:masterClrMapping/>
   </p:clrMapOvr>
-  <mc:AlternateContent xmlns:mc="http://schemas.openxmlformats.org/markup-compatibility/2006">
-    <mc:Choice xmlns:p14="http://schemas.microsoft.com/office/powerpoint/2010/main" Requires="p14">
+  <mc:AlternateContent xmlns:mc="http://schemas.openxmlformats.org/markup-compatibility/2006" xmlns:p14="http://schemas.microsoft.com/office/powerpoint/2010/main">
+    <mc:Choice Requires="p14">
       <p:transition spd="slow" p14:dur="900" advClick="0">
         <p:fade/>
       </p:transition>
     </mc:Choice>
-    <mc:Fallback>
+    <mc:Fallback xmlns="">
       <p:transition xmlns:p14="http://schemas.microsoft.com/office/powerpoint/2010/main" spd="slow" advClick="0">
         <p:fade/>
       </p:transition>
@@ -2297,11 +3185,7 @@
             </a:r>
             <a:r>
               <a:rPr lang="en-US" sz="1200" dirty="0" smtClean="0"/>
-              <a:t>.</a:t>
-            </a:r>
-            <a:r>
-              <a:rPr lang="en-US" sz="1200" dirty="0" smtClean="0"/>
-              <a:t>‹#›</a:t>
+              <a:t>.‹#›</a:t>
             </a:r>
             <a:endParaRPr lang="en-US" sz="1200" dirty="0"/>
           </a:p>
@@ -2358,22 +3242,7 @@
                 <a:uFillTx/>
                 <a:latin typeface="Comic Sans MS" pitchFamily="66" charset="0"/>
               </a:rPr>
-              <a:t>Albert R Meyer         March </a:t>
-            </a:r>
-            <a:r>
-              <a:rPr kumimoji="0" lang="en-US" sz="1200" b="0" i="0" u="none" strike="noStrike" kern="1200" cap="none" spc="0" normalizeH="0" baseline="0" noProof="0" dirty="0" smtClean="0">
-                <a:ln>
-                  <a:noFill/>
-                </a:ln>
-                <a:solidFill>
-                  <a:schemeClr val="tx1"/>
-                </a:solidFill>
-                <a:effectLst/>
-                <a:uLnTx/>
-                <a:uFillTx/>
-                <a:latin typeface="Comic Sans MS" pitchFamily="66" charset="0"/>
-              </a:rPr>
-              <a:t>13, 2013</a:t>
+              <a:t>Albert R Meyer         March 13, 2013</a:t>
             </a:r>
             <a:endParaRPr kumimoji="0" lang="en-US" sz="1200" b="0" i="0" u="none" strike="noStrike" kern="1200" cap="none" spc="0" normalizeH="0" baseline="0" noProof="0" dirty="0">
               <a:ln>
@@ -2425,13 +3294,13 @@
     <p:sldLayoutId id="2147483690" r:id="rId5"/>
     <p:sldLayoutId id="2147483685" r:id="rId6"/>
   </p:sldLayoutIdLst>
-  <mc:AlternateContent xmlns:mc="http://schemas.openxmlformats.org/markup-compatibility/2006">
-    <mc:Choice xmlns:p14="http://schemas.microsoft.com/office/powerpoint/2010/main" Requires="p14">
+  <mc:AlternateContent xmlns:mc="http://schemas.openxmlformats.org/markup-compatibility/2006" xmlns:p14="http://schemas.microsoft.com/office/powerpoint/2010/main">
+    <mc:Choice Requires="p14">
       <p:transition spd="slow" p14:dur="900" advClick="0">
         <p:fade/>
       </p:transition>
     </mc:Choice>
-    <mc:Fallback>
+    <mc:Fallback xmlns="">
       <p:transition xmlns:p14="http://schemas.microsoft.com/office/powerpoint/2010/main" spd="slow" advClick="0">
         <p:fade/>
       </p:transition>
@@ -2984,11 +3853,11 @@
   <p:clrMapOvr>
     <a:masterClrMapping/>
   </p:clrMapOvr>
-  <mc:AlternateContent xmlns:mc="http://schemas.openxmlformats.org/markup-compatibility/2006">
-    <mc:Choice xmlns:p14="http://schemas.microsoft.com/office/powerpoint/2010/main" Requires="p14">
+  <mc:AlternateContent xmlns:mc="http://schemas.openxmlformats.org/markup-compatibility/2006" xmlns:p14="http://schemas.microsoft.com/office/powerpoint/2010/main">
+    <mc:Choice Requires="p14">
       <p:transition p14:dur="0" advClick="0"/>
     </mc:Choice>
-    <mc:Fallback>
+    <mc:Fallback xmlns="">
       <p:transition xmlns:p14="http://schemas.microsoft.com/office/powerpoint/2010/main" advClick="0"/>
     </mc:Fallback>
   </mc:AlternateContent>
@@ -3066,11 +3935,7 @@
             </a:r>
             <a:r>
               <a:rPr lang="en-US" sz="1200" dirty="0" smtClean="0"/>
-              <a:t>.</a:t>
-            </a:r>
-            <a:r>
-              <a:rPr lang="en-US" sz="1200" dirty="0" smtClean="0"/>
-              <a:t>‹#›</a:t>
+              <a:t>.‹#›</a:t>
             </a:r>
             <a:endParaRPr lang="en-US" sz="1200" dirty="0"/>
           </a:p>
@@ -4113,18 +4978,7 @@
                   </a:solidFill>
                   <a:latin typeface="+mj-lt"/>
                 </a:rPr>
-                <a:t> </a:t>
-              </a:r>
-              <a:r>
-                <a:rPr lang="en-US" sz="3200" dirty="0" smtClean="0">
-                  <a:solidFill>
-                    <a:schemeClr val="accent1">
-                      <a:lumMod val="50000"/>
-                    </a:schemeClr>
-                  </a:solidFill>
-                  <a:latin typeface="+mj-lt"/>
-                </a:rPr>
-                <a:t>n?</a:t>
+                <a:t> n?</a:t>
               </a:r>
               <a:endParaRPr lang="en-US" sz="3200" dirty="0" smtClean="0">
                 <a:solidFill>
@@ -4760,11 +5614,7 @@
             </a:r>
             <a:r>
               <a:rPr lang="en-US" sz="1200" dirty="0" smtClean="0"/>
-              <a:t>.</a:t>
-            </a:r>
-            <a:r>
-              <a:rPr lang="en-US" sz="1200" dirty="0" smtClean="0"/>
-              <a:t>‹#›</a:t>
+              <a:t>.‹#›</a:t>
             </a:r>
             <a:endParaRPr lang="en-US" sz="1200" dirty="0"/>
           </a:p>
@@ -5807,18 +6657,7 @@
                   </a:solidFill>
                   <a:latin typeface="+mj-lt"/>
                 </a:rPr>
-                <a:t> </a:t>
-              </a:r>
-              <a:r>
-                <a:rPr lang="en-US" sz="3200" dirty="0" smtClean="0">
-                  <a:solidFill>
-                    <a:schemeClr val="accent1">
-                      <a:lumMod val="50000"/>
-                    </a:schemeClr>
-                  </a:solidFill>
-                  <a:latin typeface="+mj-lt"/>
-                </a:rPr>
-                <a:t>n?</a:t>
+                <a:t> n?</a:t>
               </a:r>
               <a:endParaRPr lang="en-US" sz="3200" dirty="0" smtClean="0">
                 <a:solidFill>
@@ -6368,13 +7207,13 @@
   <p:clrMapOvr>
     <a:masterClrMapping/>
   </p:clrMapOvr>
-  <mc:AlternateContent xmlns:mc="http://schemas.openxmlformats.org/markup-compatibility/2006">
-    <mc:Choice xmlns:p14="http://schemas.microsoft.com/office/powerpoint/2010/main" Requires="p14">
+  <mc:AlternateContent xmlns:mc="http://schemas.openxmlformats.org/markup-compatibility/2006" xmlns:p14="http://schemas.microsoft.com/office/powerpoint/2010/main">
+    <mc:Choice Requires="p14">
       <p:transition spd="slow" p14:dur="900" advClick="0">
         <p:fade/>
       </p:transition>
     </mc:Choice>
-    <mc:Fallback>
+    <mc:Fallback xmlns="">
       <p:transition xmlns:p14="http://schemas.microsoft.com/office/powerpoint/2010/main" spd="slow" advClick="0">
         <p:fade/>
       </p:transition>
@@ -6568,11 +7407,7 @@
             </a:r>
             <a:r>
               <a:rPr lang="en-US" sz="1200" dirty="0" smtClean="0"/>
-              <a:t>.</a:t>
-            </a:r>
-            <a:r>
-              <a:rPr lang="en-US" sz="1200" dirty="0" smtClean="0"/>
-              <a:t>‹#›</a:t>
+              <a:t>.‹#›</a:t>
             </a:r>
             <a:endParaRPr lang="en-US" sz="1200" dirty="0"/>
           </a:p>
@@ -7615,18 +8450,7 @@
                   </a:solidFill>
                   <a:latin typeface="+mj-lt"/>
                 </a:rPr>
-                <a:t> </a:t>
-              </a:r>
-              <a:r>
-                <a:rPr lang="en-US" sz="3200" dirty="0" smtClean="0">
-                  <a:solidFill>
-                    <a:schemeClr val="accent1">
-                      <a:lumMod val="50000"/>
-                    </a:schemeClr>
-                  </a:solidFill>
-                  <a:latin typeface="+mj-lt"/>
-                </a:rPr>
-                <a:t>n?</a:t>
+                <a:t> n?</a:t>
               </a:r>
               <a:endParaRPr lang="en-US" sz="3200" dirty="0" smtClean="0">
                 <a:solidFill>
@@ -8165,13 +8989,13 @@
   <p:clrMapOvr>
     <a:masterClrMapping/>
   </p:clrMapOvr>
-  <mc:AlternateContent xmlns:mc="http://schemas.openxmlformats.org/markup-compatibility/2006">
-    <mc:Choice xmlns:p14="http://schemas.microsoft.com/office/powerpoint/2010/main" Requires="p14">
+  <mc:AlternateContent xmlns:mc="http://schemas.openxmlformats.org/markup-compatibility/2006" xmlns:p14="http://schemas.microsoft.com/office/powerpoint/2010/main">
+    <mc:Choice Requires="p14">
       <p:transition spd="slow" p14:dur="900" advClick="0">
         <p:fade/>
       </p:transition>
     </mc:Choice>
-    <mc:Fallback>
+    <mc:Fallback xmlns="">
       <p:transition xmlns:p14="http://schemas.microsoft.com/office/powerpoint/2010/main" spd="slow" advClick="0">
         <p:fade/>
       </p:transition>
@@ -8330,11 +9154,7 @@
             </a:r>
             <a:r>
               <a:rPr lang="en-US" sz="1200" dirty="0" smtClean="0"/>
-              <a:t>.</a:t>
-            </a:r>
-            <a:r>
-              <a:rPr lang="en-US" sz="1200" dirty="0" smtClean="0"/>
-              <a:t>‹#›</a:t>
+              <a:t>.‹#›</a:t>
             </a:r>
             <a:endParaRPr lang="en-US" sz="1200" dirty="0"/>
           </a:p>
@@ -9836,13 +10656,13 @@
   <p:clrMapOvr>
     <a:masterClrMapping/>
   </p:clrMapOvr>
-  <mc:AlternateContent xmlns:mc="http://schemas.openxmlformats.org/markup-compatibility/2006">
-    <mc:Choice xmlns:p14="http://schemas.microsoft.com/office/powerpoint/2010/main" Requires="p14">
+  <mc:AlternateContent xmlns:mc="http://schemas.openxmlformats.org/markup-compatibility/2006" xmlns:p14="http://schemas.microsoft.com/office/powerpoint/2010/main">
+    <mc:Choice Requires="p14">
       <p:transition spd="slow" p14:dur="900" advClick="0">
         <p:fade/>
       </p:transition>
     </mc:Choice>
-    <mc:Fallback>
+    <mc:Fallback xmlns="">
       <p:transition xmlns:p14="http://schemas.microsoft.com/office/powerpoint/2010/main" spd="slow" advClick="0">
         <p:fade/>
       </p:transition>
@@ -10335,11 +11155,7 @@
             </a:r>
             <a:r>
               <a:rPr lang="en-US" sz="1200" dirty="0" smtClean="0"/>
-              <a:t>.</a:t>
-            </a:r>
-            <a:r>
-              <a:rPr lang="en-US" sz="1200" dirty="0" smtClean="0"/>
-              <a:t>‹#›</a:t>
+              <a:t>.‹#›</a:t>
             </a:r>
             <a:endParaRPr lang="en-US" sz="1200" dirty="0"/>
           </a:p>
@@ -10527,12 +11343,6 @@
                 </a:rPr>
                 <a:t>y</a:t>
               </a:r>
-              <a:endParaRPr lang="en-US" sz="4400" dirty="0" smtClean="0">
-                <a:solidFill>
-                  <a:srgbClr val="0000E5"/>
-                </a:solidFill>
-                <a:latin typeface="+mj-lt"/>
-              </a:endParaRPr>
             </a:p>
           </p:txBody>
         </p:sp>
@@ -11532,12 +12342,12 @@
           <a:graphicData uri="http://schemas.openxmlformats.org/presentationml/2006/ole">
             <mc:AlternateContent xmlns:mc="http://schemas.openxmlformats.org/markup-compatibility/2006">
               <mc:Choice xmlns:v="urn:schemas-microsoft-com:vml" Requires="v">
-                <p:oleObj spid="_x0000_s2059" name="Equation" r:id="rId3" imgW="114300" imgH="165100" progId="Equation.3">
+                <p:oleObj spid="_x0000_s2064" name="Equation" r:id="rId4" imgW="114300" imgH="165100" progId="Equation.3">
                   <p:embed/>
                 </p:oleObj>
               </mc:Choice>
               <mc:Fallback>
-                <p:oleObj name="Equation" r:id="rId3" imgW="114300" imgH="165100" progId="Equation.3">
+                <p:oleObj name="Equation" r:id="rId4" imgW="114300" imgH="165100" progId="Equation.3">
                   <p:embed/>
                   <p:pic>
                     <p:nvPicPr>
@@ -11546,7 +12356,7 @@
                       <p:nvPr/>
                     </p:nvPicPr>
                     <p:blipFill>
-                      <a:blip r:embed="rId4"/>
+                      <a:blip r:embed="rId5"/>
                       <a:stretch>
                         <a:fillRect/>
                       </a:stretch>
@@ -11589,12 +12399,12 @@
           <a:graphicData uri="http://schemas.openxmlformats.org/presentationml/2006/ole">
             <mc:AlternateContent xmlns:mc="http://schemas.openxmlformats.org/markup-compatibility/2006">
               <mc:Choice xmlns:v="urn:schemas-microsoft-com:vml" Requires="v">
-                <p:oleObj spid="_x0000_s2060" name="Equation" r:id="rId5" imgW="1130300" imgH="609600" progId="Equation.DSMT4">
+                <p:oleObj spid="_x0000_s2065" name="Equation" r:id="rId6" imgW="1130300" imgH="609600" progId="Equation.DSMT4">
                   <p:embed/>
                 </p:oleObj>
               </mc:Choice>
               <mc:Fallback>
-                <p:oleObj name="Equation" r:id="rId5" imgW="1130300" imgH="609600" progId="Equation.DSMT4">
+                <p:oleObj name="Equation" r:id="rId6" imgW="1130300" imgH="609600" progId="Equation.DSMT4">
                   <p:embed/>
                   <p:pic>
                     <p:nvPicPr>
@@ -11603,7 +12413,7 @@
                       <p:nvPr/>
                     </p:nvPicPr>
                     <p:blipFill>
-                      <a:blip r:embed="rId6"/>
+                      <a:blip r:embed="rId7"/>
                       <a:stretch>
                         <a:fillRect/>
                       </a:stretch>
@@ -11634,13 +12444,13 @@
   <p:clrMapOvr>
     <a:masterClrMapping/>
   </p:clrMapOvr>
-  <mc:AlternateContent xmlns:mc="http://schemas.openxmlformats.org/markup-compatibility/2006">
-    <mc:Choice xmlns:p14="http://schemas.microsoft.com/office/powerpoint/2010/main" Requires="p14">
+  <mc:AlternateContent xmlns:mc="http://schemas.openxmlformats.org/markup-compatibility/2006" xmlns:p14="http://schemas.microsoft.com/office/powerpoint/2010/main">
+    <mc:Choice Requires="p14">
       <p:transition spd="slow" p14:dur="900" advClick="0">
         <p:fade/>
       </p:transition>
     </mc:Choice>
-    <mc:Fallback>
+    <mc:Fallback xmlns="">
       <p:transition xmlns:p14="http://schemas.microsoft.com/office/powerpoint/2010/main" spd="slow" advClick="0">
         <p:fade/>
       </p:transition>
@@ -11658,9 +12468,6 @@
                     <p:cTn id="3" fill="hold">
                       <p:stCondLst>
                         <p:cond delay="indefinite"/>
-                        <p:cond evt="onBegin" delay="0">
-                          <p:tn val="2"/>
-                        </p:cond>
                       </p:stCondLst>
                       <p:childTnLst>
                         <p:par>
@@ -11670,7 +12477,7 @@
                             </p:stCondLst>
                             <p:childTnLst>
                               <p:par>
-                                <p:cTn id="5" presetID="10" presetClass="entr" presetSubtype="0" fill="hold" nodeType="afterEffect">
+                                <p:cTn id="5" presetID="10" presetClass="entr" presetSubtype="0" fill="hold" nodeType="clickEffect">
                                   <p:stCondLst>
                                     <p:cond delay="0"/>
                                   </p:stCondLst>
@@ -11695,7 +12502,51 @@
                                     </p:set>
                                     <p:animEffect transition="in" filter="fade">
                                       <p:cBhvr>
-                                        <p:cTn id="7" dur="1000"/>
+                                        <p:cTn id="7" dur="500"/>
+                                        <p:tgtEl>
+                                          <p:spTgt spid="16"/>
+                                        </p:tgtEl>
+                                      </p:cBhvr>
+                                    </p:animEffect>
+                                  </p:childTnLst>
+                                </p:cTn>
+                              </p:par>
+                            </p:childTnLst>
+                          </p:cTn>
+                        </p:par>
+                        <p:par>
+                          <p:cTn id="8" fill="hold">
+                            <p:stCondLst>
+                              <p:cond delay="500"/>
+                            </p:stCondLst>
+                            <p:childTnLst>
+                              <p:par>
+                                <p:cTn id="9" presetID="10" presetClass="entr" presetSubtype="0" fill="hold" nodeType="afterEffect">
+                                  <p:stCondLst>
+                                    <p:cond delay="0"/>
+                                  </p:stCondLst>
+                                  <p:childTnLst>
+                                    <p:set>
+                                      <p:cBhvr>
+                                        <p:cTn id="10" dur="1" fill="hold">
+                                          <p:stCondLst>
+                                            <p:cond delay="0"/>
+                                          </p:stCondLst>
+                                        </p:cTn>
+                                        <p:tgtEl>
+                                          <p:spTgt spid="16"/>
+                                        </p:tgtEl>
+                                        <p:attrNameLst>
+                                          <p:attrName>style.visibility</p:attrName>
+                                        </p:attrNameLst>
+                                      </p:cBhvr>
+                                      <p:to>
+                                        <p:strVal val="visible"/>
+                                      </p:to>
+                                    </p:set>
+                                    <p:animEffect transition="in" filter="fade">
+                                      <p:cBhvr>
+                                        <p:cTn id="11" dur="1000"/>
                                         <p:tgtEl>
                                           <p:spTgt spid="16"/>
                                         </p:tgtEl>
@@ -11711,26 +12562,26 @@
                     </p:cTn>
                   </p:par>
                   <p:par>
-                    <p:cTn id="8" fill="hold">
+                    <p:cTn id="12" fill="hold">
                       <p:stCondLst>
                         <p:cond delay="indefinite"/>
                       </p:stCondLst>
                       <p:childTnLst>
                         <p:par>
-                          <p:cTn id="9" fill="hold">
+                          <p:cTn id="13" fill="hold">
                             <p:stCondLst>
                               <p:cond delay="0"/>
                             </p:stCondLst>
                             <p:childTnLst>
                               <p:par>
-                                <p:cTn id="10" presetID="22" presetClass="entr" presetSubtype="8" fill="hold" nodeType="clickEffect">
+                                <p:cTn id="14" presetID="22" presetClass="entr" presetSubtype="8" fill="hold" nodeType="clickEffect">
                                   <p:stCondLst>
                                     <p:cond delay="0"/>
                                   </p:stCondLst>
                                   <p:childTnLst>
                                     <p:set>
                                       <p:cBhvr>
-                                        <p:cTn id="11" dur="1" fill="hold">
+                                        <p:cTn id="15" dur="1" fill="hold">
                                           <p:stCondLst>
                                             <p:cond delay="0"/>
                                           </p:stCondLst>
@@ -11748,7 +12599,7 @@
                                     </p:set>
                                     <p:animEffect transition="in" filter="wipe(left)">
                                       <p:cBhvr>
-                                        <p:cTn id="12" dur="500"/>
+                                        <p:cTn id="16" dur="500"/>
                                         <p:tgtEl>
                                           <p:spTgt spid="49"/>
                                         </p:tgtEl>
@@ -11761,20 +12612,20 @@
                           </p:cTn>
                         </p:par>
                         <p:par>
-                          <p:cTn id="13" fill="hold">
+                          <p:cTn id="17" fill="hold">
                             <p:stCondLst>
                               <p:cond delay="500"/>
                             </p:stCondLst>
                             <p:childTnLst>
                               <p:par>
-                                <p:cTn id="14" presetID="22" presetClass="entr" presetSubtype="8" fill="hold" nodeType="afterEffect">
+                                <p:cTn id="18" presetID="22" presetClass="entr" presetSubtype="8" fill="hold" nodeType="afterEffect">
                                   <p:stCondLst>
                                     <p:cond delay="0"/>
                                   </p:stCondLst>
                                   <p:childTnLst>
                                     <p:set>
                                       <p:cBhvr>
-                                        <p:cTn id="15" dur="1" fill="hold">
+                                        <p:cTn id="19" dur="1" fill="hold">
                                           <p:stCondLst>
                                             <p:cond delay="0"/>
                                           </p:stCondLst>
@@ -11792,7 +12643,7 @@
                                     </p:set>
                                     <p:animEffect transition="in" filter="wipe(left)">
                                       <p:cBhvr>
-                                        <p:cTn id="16" dur="500"/>
+                                        <p:cTn id="20" dur="500"/>
                                         <p:tgtEl>
                                           <p:spTgt spid="3"/>
                                         </p:tgtEl>
@@ -11808,26 +12659,26 @@
                     </p:cTn>
                   </p:par>
                   <p:par>
-                    <p:cTn id="17" fill="hold">
+                    <p:cTn id="21" fill="hold">
                       <p:stCondLst>
                         <p:cond delay="indefinite"/>
                       </p:stCondLst>
                       <p:childTnLst>
                         <p:par>
-                          <p:cTn id="18" fill="hold">
+                          <p:cTn id="22" fill="hold">
                             <p:stCondLst>
                               <p:cond delay="0"/>
                             </p:stCondLst>
                             <p:childTnLst>
                               <p:par>
-                                <p:cTn id="19" presetID="22" presetClass="entr" presetSubtype="8" fill="hold" nodeType="clickEffect">
+                                <p:cTn id="23" presetID="22" presetClass="entr" presetSubtype="8" fill="hold" nodeType="clickEffect">
                                   <p:stCondLst>
                                     <p:cond delay="0"/>
                                   </p:stCondLst>
                                   <p:childTnLst>
                                     <p:set>
                                       <p:cBhvr>
-                                        <p:cTn id="20" dur="1" fill="hold">
+                                        <p:cTn id="24" dur="1" fill="hold">
                                           <p:stCondLst>
                                             <p:cond delay="0"/>
                                           </p:stCondLst>
@@ -11845,7 +12696,7 @@
                                     </p:set>
                                     <p:animEffect transition="in" filter="wipe(left)">
                                       <p:cBhvr>
-                                        <p:cTn id="21" dur="500"/>
+                                        <p:cTn id="25" dur="500"/>
                                         <p:tgtEl>
                                           <p:spTgt spid="50"/>
                                         </p:tgtEl>
@@ -11858,20 +12709,20 @@
                           </p:cTn>
                         </p:par>
                         <p:par>
-                          <p:cTn id="22" fill="hold">
+                          <p:cTn id="26" fill="hold">
                             <p:stCondLst>
                               <p:cond delay="500"/>
                             </p:stCondLst>
                             <p:childTnLst>
                               <p:par>
-                                <p:cTn id="23" presetID="22" presetClass="entr" presetSubtype="8" fill="hold" nodeType="afterEffect">
+                                <p:cTn id="27" presetID="22" presetClass="entr" presetSubtype="8" fill="hold" nodeType="afterEffect">
                                   <p:stCondLst>
                                     <p:cond delay="0"/>
                                   </p:stCondLst>
                                   <p:childTnLst>
                                     <p:set>
                                       <p:cBhvr>
-                                        <p:cTn id="24" dur="1" fill="hold">
+                                        <p:cTn id="28" dur="1" fill="hold">
                                           <p:stCondLst>
                                             <p:cond delay="0"/>
                                           </p:stCondLst>
@@ -11889,7 +12740,7 @@
                                     </p:set>
                                     <p:animEffect transition="in" filter="wipe(left)">
                                       <p:cBhvr>
-                                        <p:cTn id="25" dur="500"/>
+                                        <p:cTn id="29" dur="500"/>
                                         <p:tgtEl>
                                           <p:spTgt spid="6"/>
                                         </p:tgtEl>
@@ -11905,26 +12756,26 @@
                     </p:cTn>
                   </p:par>
                   <p:par>
-                    <p:cTn id="26" fill="hold">
+                    <p:cTn id="30" fill="hold">
                       <p:stCondLst>
                         <p:cond delay="indefinite"/>
                       </p:stCondLst>
                       <p:childTnLst>
                         <p:par>
-                          <p:cTn id="27" fill="hold">
+                          <p:cTn id="31" fill="hold">
                             <p:stCondLst>
                               <p:cond delay="0"/>
                             </p:stCondLst>
                             <p:childTnLst>
                               <p:par>
-                                <p:cTn id="28" presetID="22" presetClass="entr" presetSubtype="8" fill="hold" nodeType="clickEffect">
+                                <p:cTn id="32" presetID="22" presetClass="entr" presetSubtype="8" fill="hold" nodeType="clickEffect">
                                   <p:stCondLst>
                                     <p:cond delay="0"/>
                                   </p:stCondLst>
                                   <p:childTnLst>
                                     <p:set>
                                       <p:cBhvr>
-                                        <p:cTn id="29" dur="1" fill="hold">
+                                        <p:cTn id="33" dur="1" fill="hold">
                                           <p:stCondLst>
                                             <p:cond delay="0"/>
                                           </p:stCondLst>
@@ -11942,7 +12793,7 @@
                                     </p:set>
                                     <p:animEffect transition="in" filter="wipe(left)">
                                       <p:cBhvr>
-                                        <p:cTn id="30" dur="500"/>
+                                        <p:cTn id="34" dur="500"/>
                                         <p:tgtEl>
                                           <p:spTgt spid="7"/>
                                         </p:tgtEl>
@@ -11955,20 +12806,20 @@
                           </p:cTn>
                         </p:par>
                         <p:par>
-                          <p:cTn id="31" fill="hold">
+                          <p:cTn id="35" fill="hold">
                             <p:stCondLst>
                               <p:cond delay="500"/>
                             </p:stCondLst>
                             <p:childTnLst>
                               <p:par>
-                                <p:cTn id="32" presetID="22" presetClass="entr" presetSubtype="8" fill="hold" nodeType="afterEffect">
+                                <p:cTn id="36" presetID="22" presetClass="entr" presetSubtype="8" fill="hold" nodeType="afterEffect">
                                   <p:stCondLst>
                                     <p:cond delay="0"/>
                                   </p:stCondLst>
                                   <p:childTnLst>
                                     <p:set>
                                       <p:cBhvr>
-                                        <p:cTn id="33" dur="1" fill="hold">
+                                        <p:cTn id="37" dur="1" fill="hold">
                                           <p:stCondLst>
                                             <p:cond delay="0"/>
                                           </p:stCondLst>
@@ -11986,7 +12837,7 @@
                                     </p:set>
                                     <p:animEffect transition="in" filter="wipe(left)">
                                       <p:cBhvr>
-                                        <p:cTn id="34" dur="500"/>
+                                        <p:cTn id="38" dur="500"/>
                                         <p:tgtEl>
                                           <p:spTgt spid="47"/>
                                         </p:tgtEl>
@@ -12002,26 +12853,26 @@
                     </p:cTn>
                   </p:par>
                   <p:par>
-                    <p:cTn id="35" fill="hold">
+                    <p:cTn id="39" fill="hold">
                       <p:stCondLst>
                         <p:cond delay="indefinite"/>
                       </p:stCondLst>
                       <p:childTnLst>
                         <p:par>
-                          <p:cTn id="36" fill="hold">
+                          <p:cTn id="40" fill="hold">
                             <p:stCondLst>
                               <p:cond delay="0"/>
                             </p:stCondLst>
                             <p:childTnLst>
                               <p:par>
-                                <p:cTn id="37" presetID="10" presetClass="entr" presetSubtype="0" fill="hold" nodeType="clickEffect">
+                                <p:cTn id="41" presetID="10" presetClass="entr" presetSubtype="0" fill="hold" nodeType="clickEffect">
                                   <p:stCondLst>
                                     <p:cond delay="0"/>
                                   </p:stCondLst>
                                   <p:childTnLst>
                                     <p:set>
                                       <p:cBhvr>
-                                        <p:cTn id="38" dur="1" fill="hold">
+                                        <p:cTn id="42" dur="1" fill="hold">
                                           <p:stCondLst>
                                             <p:cond delay="0"/>
                                           </p:stCondLst>
@@ -12039,7 +12890,7 @@
                                     </p:set>
                                     <p:animEffect transition="in" filter="fade">
                                       <p:cBhvr>
-                                        <p:cTn id="39" dur="500"/>
+                                        <p:cTn id="43" dur="500"/>
                                         <p:tgtEl>
                                           <p:spTgt spid="9"/>
                                         </p:tgtEl>
@@ -12143,11 +12994,7 @@
             </a:r>
             <a:r>
               <a:rPr lang="en-US" sz="1200" dirty="0" smtClean="0"/>
-              <a:t>.</a:t>
-            </a:r>
-            <a:r>
-              <a:rPr lang="en-US" sz="1200" dirty="0" smtClean="0"/>
-              <a:t>‹#›</a:t>
+              <a:t>.‹#›</a:t>
             </a:r>
             <a:endParaRPr lang="en-US" sz="1200" dirty="0"/>
           </a:p>
@@ -13280,7 +14127,7 @@
           <a:graphicData uri="http://schemas.openxmlformats.org/presentationml/2006/ole">
             <mc:AlternateContent xmlns:mc="http://schemas.openxmlformats.org/markup-compatibility/2006">
               <mc:Choice xmlns:v="urn:schemas-microsoft-com:vml" Requires="v">
-                <p:oleObj spid="_x0000_s1030" name="Equation" r:id="rId3" imgW="114300" imgH="165100" progId="Equation.3">
+                <p:oleObj spid="_x0000_s1033" name="Equation" r:id="rId3" imgW="114300" imgH="165100" progId="Equation.3">
                   <p:embed/>
                 </p:oleObj>
               </mc:Choice>
@@ -13588,11 +14435,7 @@
             </a:r>
             <a:r>
               <a:rPr lang="en-US" sz="1200" dirty="0" smtClean="0"/>
-              <a:t>.</a:t>
-            </a:r>
-            <a:r>
-              <a:rPr lang="en-US" sz="1200" dirty="0" smtClean="0"/>
-              <a:t>‹#›</a:t>
+              <a:t>.‹#›</a:t>
             </a:r>
             <a:endParaRPr lang="en-US" sz="1200" dirty="0"/>
           </a:p>
@@ -14676,18 +15519,7 @@
                   </a:solidFill>
                   <a:latin typeface="+mj-lt"/>
                 </a:rPr>
-                <a:t> </a:t>
-              </a:r>
-              <a:r>
-                <a:rPr lang="en-US" sz="3200" dirty="0" smtClean="0">
-                  <a:solidFill>
-                    <a:schemeClr val="accent1">
-                      <a:lumMod val="50000"/>
-                    </a:schemeClr>
-                  </a:solidFill>
-                  <a:latin typeface="+mj-lt"/>
-                </a:rPr>
-                <a:t>n?</a:t>
+                <a:t> n?</a:t>
               </a:r>
               <a:endParaRPr lang="en-US" sz="3200" dirty="0" smtClean="0">
                 <a:solidFill>
@@ -14821,13 +15653,13 @@
   <p:clrMapOvr>
     <a:masterClrMapping/>
   </p:clrMapOvr>
-  <mc:AlternateContent xmlns:mc="http://schemas.openxmlformats.org/markup-compatibility/2006">
-    <mc:Choice xmlns:p14="http://schemas.microsoft.com/office/powerpoint/2010/main" Requires="p14">
+  <mc:AlternateContent xmlns:mc="http://schemas.openxmlformats.org/markup-compatibility/2006" xmlns:p14="http://schemas.microsoft.com/office/powerpoint/2010/main">
+    <mc:Choice Requires="p14">
       <p:transition spd="slow" p14:dur="900" advClick="0">
         <p:fade/>
       </p:transition>
     </mc:Choice>
-    <mc:Fallback>
+    <mc:Fallback xmlns="">
       <p:transition xmlns:p14="http://schemas.microsoft.com/office/powerpoint/2010/main" spd="slow" advClick="0">
         <p:fade/>
       </p:transition>
@@ -15021,11 +15853,7 @@
             </a:r>
             <a:r>
               <a:rPr lang="en-US" sz="1200" dirty="0" smtClean="0"/>
-              <a:t>.</a:t>
-            </a:r>
-            <a:r>
-              <a:rPr lang="en-US" sz="1200" dirty="0" smtClean="0"/>
-              <a:t>‹#›</a:t>
+              <a:t>.‹#›</a:t>
             </a:r>
             <a:endParaRPr lang="en-US" sz="1200" dirty="0"/>
           </a:p>
@@ -16068,18 +16896,7 @@
                   </a:solidFill>
                   <a:latin typeface="+mj-lt"/>
                 </a:rPr>
-                <a:t> </a:t>
-              </a:r>
-              <a:r>
-                <a:rPr lang="en-US" sz="3200" dirty="0" smtClean="0">
-                  <a:solidFill>
-                    <a:schemeClr val="accent1">
-                      <a:lumMod val="50000"/>
-                    </a:schemeClr>
-                  </a:solidFill>
-                  <a:latin typeface="+mj-lt"/>
-                </a:rPr>
-                <a:t>n?</a:t>
+                <a:t> n?</a:t>
               </a:r>
               <a:endParaRPr lang="en-US" sz="3200" dirty="0" smtClean="0">
                 <a:solidFill>
@@ -16622,11 +17439,7 @@
             </a:r>
             <a:r>
               <a:rPr lang="en-US" sz="1200" dirty="0" smtClean="0"/>
-              <a:t>.</a:t>
-            </a:r>
-            <a:r>
-              <a:rPr lang="en-US" sz="1200" dirty="0" smtClean="0"/>
-              <a:t>‹#›</a:t>
+              <a:t>.‹#›</a:t>
             </a:r>
             <a:endParaRPr lang="en-US" sz="1200" dirty="0"/>
           </a:p>
@@ -17669,18 +18482,7 @@
                   </a:solidFill>
                   <a:latin typeface="+mj-lt"/>
                 </a:rPr>
-                <a:t> </a:t>
-              </a:r>
-              <a:r>
-                <a:rPr lang="en-US" sz="3200" dirty="0" smtClean="0">
-                  <a:solidFill>
-                    <a:schemeClr val="accent1">
-                      <a:lumMod val="50000"/>
-                    </a:schemeClr>
-                  </a:solidFill>
-                  <a:latin typeface="+mj-lt"/>
-                </a:rPr>
-                <a:t>n?</a:t>
+                <a:t> n?</a:t>
               </a:r>
               <a:endParaRPr lang="en-US" sz="3200" dirty="0" smtClean="0">
                 <a:solidFill>
@@ -18230,13 +19032,13 @@
   <p:clrMapOvr>
     <a:masterClrMapping/>
   </p:clrMapOvr>
-  <mc:AlternateContent xmlns:mc="http://schemas.openxmlformats.org/markup-compatibility/2006">
-    <mc:Choice xmlns:p14="http://schemas.microsoft.com/office/powerpoint/2010/main" Requires="p14">
+  <mc:AlternateContent xmlns:mc="http://schemas.openxmlformats.org/markup-compatibility/2006" xmlns:p14="http://schemas.microsoft.com/office/powerpoint/2010/main">
+    <mc:Choice Requires="p14">
       <p:transition spd="slow" p14:dur="900" advClick="0">
         <p:fade/>
       </p:transition>
     </mc:Choice>
-    <mc:Fallback>
+    <mc:Fallback xmlns="">
       <p:transition xmlns:p14="http://schemas.microsoft.com/office/powerpoint/2010/main" spd="slow" advClick="0">
         <p:fade/>
       </p:transition>
@@ -18316,11 +19118,7 @@
             </a:r>
             <a:r>
               <a:rPr lang="en-US" sz="1200" dirty="0" smtClean="0"/>
-              <a:t>.</a:t>
-            </a:r>
-            <a:r>
-              <a:rPr lang="en-US" sz="1200" dirty="0" smtClean="0"/>
-              <a:t>‹#›</a:t>
+              <a:t>.‹#›</a:t>
             </a:r>
             <a:endParaRPr lang="en-US" sz="1200" dirty="0"/>
           </a:p>
@@ -19363,18 +20161,7 @@
                   </a:solidFill>
                   <a:latin typeface="+mj-lt"/>
                 </a:rPr>
-                <a:t> </a:t>
-              </a:r>
-              <a:r>
-                <a:rPr lang="en-US" sz="3200" dirty="0" smtClean="0">
-                  <a:solidFill>
-                    <a:schemeClr val="accent1">
-                      <a:lumMod val="50000"/>
-                    </a:schemeClr>
-                  </a:solidFill>
-                  <a:latin typeface="+mj-lt"/>
-                </a:rPr>
-                <a:t>n?</a:t>
+                <a:t> n?</a:t>
               </a:r>
               <a:endParaRPr lang="en-US" sz="3200" dirty="0" smtClean="0">
                 <a:solidFill>
@@ -19924,13 +20711,13 @@
   <p:clrMapOvr>
     <a:masterClrMapping/>
   </p:clrMapOvr>
-  <mc:AlternateContent xmlns:mc="http://schemas.openxmlformats.org/markup-compatibility/2006">
-    <mc:Choice xmlns:p14="http://schemas.microsoft.com/office/powerpoint/2010/main" Requires="p14">
+  <mc:AlternateContent xmlns:mc="http://schemas.openxmlformats.org/markup-compatibility/2006" xmlns:p14="http://schemas.microsoft.com/office/powerpoint/2010/main">
+    <mc:Choice Requires="p14">
       <p:transition spd="slow" p14:dur="900" advClick="0">
         <p:fade/>
       </p:transition>
     </mc:Choice>
-    <mc:Fallback>
+    <mc:Fallback xmlns="">
       <p:transition xmlns:p14="http://schemas.microsoft.com/office/powerpoint/2010/main" spd="slow" advClick="0">
         <p:fade/>
       </p:transition>
@@ -20010,11 +20797,7 @@
             </a:r>
             <a:r>
               <a:rPr lang="en-US" sz="1200" dirty="0" smtClean="0"/>
-              <a:t>.</a:t>
-            </a:r>
-            <a:r>
-              <a:rPr lang="en-US" sz="1200" dirty="0" smtClean="0"/>
-              <a:t>‹#›</a:t>
+              <a:t>.‹#›</a:t>
             </a:r>
             <a:endParaRPr lang="en-US" sz="1200" dirty="0"/>
           </a:p>
@@ -21057,18 +21840,7 @@
                   </a:solidFill>
                   <a:latin typeface="+mj-lt"/>
                 </a:rPr>
-                <a:t> </a:t>
-              </a:r>
-              <a:r>
-                <a:rPr lang="en-US" sz="3200" dirty="0" smtClean="0">
-                  <a:solidFill>
-                    <a:schemeClr val="accent1">
-                      <a:lumMod val="50000"/>
-                    </a:schemeClr>
-                  </a:solidFill>
-                  <a:latin typeface="+mj-lt"/>
-                </a:rPr>
-                <a:t>n?</a:t>
+                <a:t> n?</a:t>
               </a:r>
               <a:endParaRPr lang="en-US" sz="3200" dirty="0" smtClean="0">
                 <a:solidFill>
@@ -21621,13 +22393,13 @@
   <p:clrMapOvr>
     <a:masterClrMapping/>
   </p:clrMapOvr>
-  <mc:AlternateContent xmlns:mc="http://schemas.openxmlformats.org/markup-compatibility/2006">
-    <mc:Choice xmlns:p14="http://schemas.microsoft.com/office/powerpoint/2010/main" Requires="p14">
+  <mc:AlternateContent xmlns:mc="http://schemas.openxmlformats.org/markup-compatibility/2006" xmlns:p14="http://schemas.microsoft.com/office/powerpoint/2010/main">
+    <mc:Choice Requires="p14">
       <p:transition spd="slow" p14:dur="900" advClick="0">
         <p:fade/>
       </p:transition>
     </mc:Choice>
-    <mc:Fallback>
+    <mc:Fallback xmlns="">
       <p:transition xmlns:p14="http://schemas.microsoft.com/office/powerpoint/2010/main" spd="slow" advClick="0">
         <p:fade/>
       </p:transition>
@@ -21821,11 +22593,7 @@
             </a:r>
             <a:r>
               <a:rPr lang="en-US" sz="1200" dirty="0" smtClean="0"/>
-              <a:t>.</a:t>
-            </a:r>
-            <a:r>
-              <a:rPr lang="en-US" sz="1200" dirty="0" smtClean="0"/>
-              <a:t>‹#›</a:t>
+              <a:t>.‹#›</a:t>
             </a:r>
             <a:endParaRPr lang="en-US" sz="1200" dirty="0"/>
           </a:p>
@@ -22868,18 +23636,7 @@
                   </a:solidFill>
                   <a:latin typeface="+mj-lt"/>
                 </a:rPr>
-                <a:t> </a:t>
-              </a:r>
-              <a:r>
-                <a:rPr lang="en-US" sz="3200" dirty="0" smtClean="0">
-                  <a:solidFill>
-                    <a:schemeClr val="accent1">
-                      <a:lumMod val="50000"/>
-                    </a:schemeClr>
-                  </a:solidFill>
-                  <a:latin typeface="+mj-lt"/>
-                </a:rPr>
-                <a:t>n?</a:t>
+                <a:t> n?</a:t>
               </a:r>
               <a:endParaRPr lang="en-US" sz="3200" dirty="0" smtClean="0">
                 <a:solidFill>
@@ -23042,12 +23799,6 @@
                   </a:rPr>
                   <a:t>1</a:t>
                 </a:r>
-                <a:endParaRPr lang="en-US" sz="3200" dirty="0" smtClean="0">
-                  <a:solidFill>
-                    <a:srgbClr val="FF0000"/>
-                  </a:solidFill>
-                  <a:latin typeface="+mj-lt"/>
-                </a:endParaRPr>
               </a:p>
             </p:txBody>
           </p:sp>
@@ -23443,13 +24194,13 @@
   <p:clrMapOvr>
     <a:masterClrMapping/>
   </p:clrMapOvr>
-  <mc:AlternateContent xmlns:mc="http://schemas.openxmlformats.org/markup-compatibility/2006">
-    <mc:Choice xmlns:p14="http://schemas.microsoft.com/office/powerpoint/2010/main" Requires="p14">
+  <mc:AlternateContent xmlns:mc="http://schemas.openxmlformats.org/markup-compatibility/2006" xmlns:p14="http://schemas.microsoft.com/office/powerpoint/2010/main">
+    <mc:Choice Requires="p14">
       <p:transition spd="slow" p14:dur="900" advClick="0">
         <p:fade/>
       </p:transition>
     </mc:Choice>
-    <mc:Fallback>
+    <mc:Fallback xmlns="">
       <p:transition xmlns:p14="http://schemas.microsoft.com/office/powerpoint/2010/main" spd="slow" advClick="0">
         <p:fade/>
       </p:transition>

</xml_diff>